<commit_message>
i think I successfully changed the icon and logo
</commit_message>
<xml_diff>
--- a/logo/logo_design.pptx
+++ b/logo/logo_design.pptx
@@ -35418,7 +35418,7 @@
             <a:avLst/>
           </a:prstGeom>
           <a:noFill/>
-          <a:ln w="3175">
+          <a:ln w="38100">
             <a:solidFill>
               <a:schemeClr val="tx1"/>
             </a:solidFill>
@@ -35581,7 +35581,7 @@
           <a:solidFill>
             <a:srgbClr val="2C80B8"/>
           </a:solidFill>
-          <a:ln w="3175">
+          <a:ln w="25400">
             <a:solidFill>
               <a:schemeClr val="tx1"/>
             </a:solidFill>
@@ -35780,7 +35780,7 @@
           <a:solidFill>
             <a:srgbClr val="7FCEBB"/>
           </a:solidFill>
-          <a:ln w="3175">
+          <a:ln w="25400">
             <a:solidFill>
               <a:schemeClr val="tx1"/>
             </a:solidFill>
@@ -36125,7 +36125,7 @@
           <a:solidFill>
             <a:srgbClr val="EDF9B1"/>
           </a:solidFill>
-          <a:ln w="3175">
+          <a:ln w="25400">
             <a:solidFill>
               <a:schemeClr val="tx1"/>
             </a:solidFill>

</xml_diff>